<commit_message>
writing functional programming docs
</commit_message>
<xml_diff>
--- a/Chapter 09 - Functional Programming/files/PureFunctions.pptx
+++ b/Chapter 09 - Functional Programming/files/PureFunctions.pptx
@@ -104,6 +104,11 @@
       </a:defRPr>
     </a:lvl9pPr>
   </p:defaultTextStyle>
+  <p:extLst>
+    <p:ext uri="{EFAFB233-063F-42B5-8137-9DF3F51BA10A}">
+      <p15:sldGuideLst xmlns:p15="http://schemas.microsoft.com/office/powerpoint/2012/main"/>
+    </p:ext>
+  </p:extLst>
 </p:presentation>
 </file>
 
@@ -238,7 +243,7 @@
           <a:p>
             <a:fld id="{C18BEBCB-9FEC-4A6E-B138-8E4370C831B3}" type="datetimeFigureOut">
               <a:rPr lang="en-IN" smtClean="0"/>
-              <a:t>16-04-2017</a:t>
+              <a:t>18-04-2017</a:t>
             </a:fld>
             <a:endParaRPr lang="en-IN"/>
           </a:p>
@@ -408,7 +413,7 @@
           <a:p>
             <a:fld id="{C18BEBCB-9FEC-4A6E-B138-8E4370C831B3}" type="datetimeFigureOut">
               <a:rPr lang="en-IN" smtClean="0"/>
-              <a:t>16-04-2017</a:t>
+              <a:t>18-04-2017</a:t>
             </a:fld>
             <a:endParaRPr lang="en-IN"/>
           </a:p>
@@ -588,7 +593,7 @@
           <a:p>
             <a:fld id="{C18BEBCB-9FEC-4A6E-B138-8E4370C831B3}" type="datetimeFigureOut">
               <a:rPr lang="en-IN" smtClean="0"/>
-              <a:t>16-04-2017</a:t>
+              <a:t>18-04-2017</a:t>
             </a:fld>
             <a:endParaRPr lang="en-IN"/>
           </a:p>
@@ -758,7 +763,7 @@
           <a:p>
             <a:fld id="{C18BEBCB-9FEC-4A6E-B138-8E4370C831B3}" type="datetimeFigureOut">
               <a:rPr lang="en-IN" smtClean="0"/>
-              <a:t>16-04-2017</a:t>
+              <a:t>18-04-2017</a:t>
             </a:fld>
             <a:endParaRPr lang="en-IN"/>
           </a:p>
@@ -1004,7 +1009,7 @@
           <a:p>
             <a:fld id="{C18BEBCB-9FEC-4A6E-B138-8E4370C831B3}" type="datetimeFigureOut">
               <a:rPr lang="en-IN" smtClean="0"/>
-              <a:t>16-04-2017</a:t>
+              <a:t>18-04-2017</a:t>
             </a:fld>
             <a:endParaRPr lang="en-IN"/>
           </a:p>
@@ -1236,7 +1241,7 @@
           <a:p>
             <a:fld id="{C18BEBCB-9FEC-4A6E-B138-8E4370C831B3}" type="datetimeFigureOut">
               <a:rPr lang="en-IN" smtClean="0"/>
-              <a:t>16-04-2017</a:t>
+              <a:t>18-04-2017</a:t>
             </a:fld>
             <a:endParaRPr lang="en-IN"/>
           </a:p>
@@ -1603,7 +1608,7 @@
           <a:p>
             <a:fld id="{C18BEBCB-9FEC-4A6E-B138-8E4370C831B3}" type="datetimeFigureOut">
               <a:rPr lang="en-IN" smtClean="0"/>
-              <a:t>16-04-2017</a:t>
+              <a:t>18-04-2017</a:t>
             </a:fld>
             <a:endParaRPr lang="en-IN"/>
           </a:p>
@@ -1721,7 +1726,7 @@
           <a:p>
             <a:fld id="{C18BEBCB-9FEC-4A6E-B138-8E4370C831B3}" type="datetimeFigureOut">
               <a:rPr lang="en-IN" smtClean="0"/>
-              <a:t>16-04-2017</a:t>
+              <a:t>18-04-2017</a:t>
             </a:fld>
             <a:endParaRPr lang="en-IN"/>
           </a:p>
@@ -1816,7 +1821,7 @@
           <a:p>
             <a:fld id="{C18BEBCB-9FEC-4A6E-B138-8E4370C831B3}" type="datetimeFigureOut">
               <a:rPr lang="en-IN" smtClean="0"/>
-              <a:t>16-04-2017</a:t>
+              <a:t>18-04-2017</a:t>
             </a:fld>
             <a:endParaRPr lang="en-IN"/>
           </a:p>
@@ -2093,7 +2098,7 @@
           <a:p>
             <a:fld id="{C18BEBCB-9FEC-4A6E-B138-8E4370C831B3}" type="datetimeFigureOut">
               <a:rPr lang="en-IN" smtClean="0"/>
-              <a:t>16-04-2017</a:t>
+              <a:t>18-04-2017</a:t>
             </a:fld>
             <a:endParaRPr lang="en-IN"/>
           </a:p>
@@ -2346,7 +2351,7 @@
           <a:p>
             <a:fld id="{C18BEBCB-9FEC-4A6E-B138-8E4370C831B3}" type="datetimeFigureOut">
               <a:rPr lang="en-IN" smtClean="0"/>
-              <a:t>16-04-2017</a:t>
+              <a:t>18-04-2017</a:t>
             </a:fld>
             <a:endParaRPr lang="en-IN"/>
           </a:p>
@@ -2559,7 +2564,7 @@
           <a:p>
             <a:fld id="{C18BEBCB-9FEC-4A6E-B138-8E4370C831B3}" type="datetimeFigureOut">
               <a:rPr lang="en-IN" smtClean="0"/>
-              <a:t>16-04-2017</a:t>
+              <a:t>18-04-2017</a:t>
             </a:fld>
             <a:endParaRPr lang="en-IN"/>
           </a:p>
@@ -2964,216 +2969,248 @@
           <a:chExt cx="0" cy="0"/>
         </a:xfrm>
       </p:grpSpPr>
-      <p:sp>
-        <p:nvSpPr>
-          <p:cNvPr id="17" name="Snip and Round Single Corner Rectangle 16"/>
-          <p:cNvSpPr/>
+      <p:grpSp>
+        <p:nvGrpSpPr>
+          <p:cNvPr id="2" name="Group 1"/>
+          <p:cNvGrpSpPr/>
           <p:nvPr/>
-        </p:nvSpPr>
-        <p:spPr>
+        </p:nvGrpSpPr>
+        <p:grpSpPr>
           <a:xfrm>
-            <a:off x="4628271" y="1927274"/>
-            <a:ext cx="3404381" cy="2180492"/>
+            <a:off x="1436914" y="1003846"/>
+            <a:ext cx="8219551" cy="1442943"/>
+            <a:chOff x="2103120" y="2976337"/>
+            <a:chExt cx="8219551" cy="1442943"/>
           </a:xfrm>
-          <a:prstGeom prst="snipRoundRect">
-            <a:avLst>
-              <a:gd name="adj1" fmla="val 0"/>
-              <a:gd name="adj2" fmla="val 16667"/>
-            </a:avLst>
-          </a:prstGeom>
-        </p:spPr>
-        <p:style>
-          <a:lnRef idx="2">
-            <a:schemeClr val="accent1">
-              <a:shade val="50000"/>
-            </a:schemeClr>
-          </a:lnRef>
-          <a:fillRef idx="1">
-            <a:schemeClr val="accent1"/>
-          </a:fillRef>
-          <a:effectRef idx="0">
-            <a:schemeClr val="accent1"/>
-          </a:effectRef>
-          <a:fontRef idx="minor">
-            <a:schemeClr val="lt1"/>
-          </a:fontRef>
-        </p:style>
-        <p:txBody>
-          <a:bodyPr rtlCol="0" anchor="ctr"/>
-          <a:lstStyle/>
-          <a:p>
-            <a:pPr algn="ctr"/>
-            <a:r>
-              <a:rPr lang="en-IN" sz="4000" dirty="0" smtClean="0"/>
-              <a:t>Function</a:t>
-            </a:r>
-            <a:endParaRPr lang="en-IN" sz="6000" dirty="0" smtClean="0"/>
-          </a:p>
-          <a:p>
-            <a:pPr algn="ctr"/>
-            <a:r>
-              <a:rPr lang="en-IN" sz="6000" b="1" dirty="0" smtClean="0"/>
-              <a:t>f</a:t>
-            </a:r>
-            <a:endParaRPr lang="en-IN" b="1" dirty="0"/>
-          </a:p>
-        </p:txBody>
-      </p:sp>
-      <p:sp>
-        <p:nvSpPr>
-          <p:cNvPr id="20" name="Right Arrow 19"/>
-          <p:cNvSpPr/>
-          <p:nvPr/>
-        </p:nvSpPr>
-        <p:spPr>
-          <a:xfrm>
-            <a:off x="8032652" y="2118943"/>
-            <a:ext cx="1899139" cy="1797149"/>
-          </a:xfrm>
-          <a:prstGeom prst="rightArrow">
-            <a:avLst/>
-          </a:prstGeom>
-        </p:spPr>
-        <p:style>
-          <a:lnRef idx="2">
-            <a:schemeClr val="accent1">
-              <a:shade val="50000"/>
-            </a:schemeClr>
-          </a:lnRef>
-          <a:fillRef idx="1">
-            <a:schemeClr val="accent1"/>
-          </a:fillRef>
-          <a:effectRef idx="0">
-            <a:schemeClr val="accent1"/>
-          </a:effectRef>
-          <a:fontRef idx="minor">
-            <a:schemeClr val="lt1"/>
-          </a:fontRef>
-        </p:style>
-        <p:txBody>
-          <a:bodyPr rtlCol="0" anchor="ctr"/>
-          <a:lstStyle/>
-          <a:p>
-            <a:pPr algn="ctr"/>
-            <a:r>
-              <a:rPr lang="en-IN" sz="3200" dirty="0" smtClean="0">
-                <a:ln w="0"/>
+        </p:grpSpPr>
+        <p:sp>
+          <p:nvSpPr>
+            <p:cNvPr id="17" name="Snip and Round Single Corner Rectangle 16"/>
+            <p:cNvSpPr/>
+            <p:nvPr/>
+          </p:nvSpPr>
+          <p:spPr>
+            <a:xfrm>
+              <a:off x="4510705" y="2976337"/>
+              <a:ext cx="3404381" cy="1442943"/>
+            </a:xfrm>
+            <a:prstGeom prst="snipRoundRect">
+              <a:avLst>
+                <a:gd name="adj1" fmla="val 0"/>
+                <a:gd name="adj2" fmla="val 16667"/>
+              </a:avLst>
+            </a:prstGeom>
+            <a:noFill/>
+            <a:ln w="9525" cap="flat" cmpd="sng" algn="ctr">
+              <a:solidFill>
+                <a:schemeClr val="accent6"/>
+              </a:solidFill>
+              <a:prstDash val="solid"/>
+              <a:round/>
+              <a:headEnd type="none" w="med" len="med"/>
+              <a:tailEnd type="none" w="med" len="med"/>
+            </a:ln>
+          </p:spPr>
+          <p:style>
+            <a:lnRef idx="0">
+              <a:scrgbClr r="0" g="0" b="0"/>
+            </a:lnRef>
+            <a:fillRef idx="0">
+              <a:scrgbClr r="0" g="0" b="0"/>
+            </a:fillRef>
+            <a:effectRef idx="0">
+              <a:scrgbClr r="0" g="0" b="0"/>
+            </a:effectRef>
+            <a:fontRef idx="minor">
+              <a:schemeClr val="accent6"/>
+            </a:fontRef>
+          </p:style>
+          <p:txBody>
+            <a:bodyPr rtlCol="0" anchor="ctr"/>
+            <a:lstStyle/>
+            <a:p>
+              <a:pPr algn="ctr"/>
+              <a:r>
+                <a:rPr lang="en-IN" sz="4000" dirty="0" smtClean="0"/>
+                <a:t>Function</a:t>
+              </a:r>
+              <a:endParaRPr lang="en-IN" sz="6000" dirty="0" smtClean="0"/>
+            </a:p>
+            <a:p>
+              <a:pPr algn="ctr"/>
+              <a:r>
+                <a:rPr lang="en-IN" sz="6000" b="1" dirty="0" smtClean="0"/>
+                <a:t>f</a:t>
+              </a:r>
+              <a:endParaRPr lang="en-IN" b="1" dirty="0"/>
+            </a:p>
+          </p:txBody>
+        </p:sp>
+        <p:sp>
+          <p:nvSpPr>
+            <p:cNvPr id="20" name="Right Arrow 19"/>
+            <p:cNvSpPr/>
+            <p:nvPr/>
+          </p:nvSpPr>
+          <p:spPr>
+            <a:xfrm>
+              <a:off x="7915086" y="3055435"/>
+              <a:ext cx="2407585" cy="1284747"/>
+            </a:xfrm>
+            <a:prstGeom prst="rightArrow">
+              <a:avLst/>
+            </a:prstGeom>
+            <a:solidFill>
+              <a:schemeClr val="dk1">
+                <a:alpha val="50000"/>
+              </a:schemeClr>
+            </a:solidFill>
+            <a:ln>
+              <a:noFill/>
+            </a:ln>
+          </p:spPr>
+          <p:style>
+            <a:lnRef idx="0">
+              <a:scrgbClr r="0" g="0" b="0"/>
+            </a:lnRef>
+            <a:fillRef idx="0">
+              <a:scrgbClr r="0" g="0" b="0"/>
+            </a:fillRef>
+            <a:effectRef idx="0">
+              <a:scrgbClr r="0" g="0" b="0"/>
+            </a:effectRef>
+            <a:fontRef idx="minor">
+              <a:schemeClr val="lt1"/>
+            </a:fontRef>
+          </p:style>
+          <p:txBody>
+            <a:bodyPr rtlCol="0" anchor="ctr"/>
+            <a:lstStyle/>
+            <a:p>
+              <a:pPr algn="ctr"/>
+              <a:r>
+                <a:rPr lang="en-IN" sz="3200" dirty="0" smtClean="0">
+                  <a:ln w="0"/>
+                  <a:solidFill>
+                    <a:schemeClr val="bg1"/>
+                  </a:solidFill>
+                  <a:effectLst>
+                    <a:outerShdw blurRad="38100" dist="19050" dir="2700000" algn="tl" rotWithShape="0">
+                      <a:schemeClr val="dk1">
+                        <a:alpha val="40000"/>
+                      </a:schemeClr>
+                    </a:outerShdw>
+                  </a:effectLst>
+                </a:rPr>
+                <a:t>Output </a:t>
+              </a:r>
+              <a:r>
+                <a:rPr lang="en-IN" sz="3200" b="1" dirty="0" smtClean="0">
+                  <a:ln w="0"/>
+                  <a:solidFill>
+                    <a:schemeClr val="bg1"/>
+                  </a:solidFill>
+                  <a:effectLst>
+                    <a:outerShdw blurRad="38100" dist="19050" dir="2700000" algn="tl" rotWithShape="0">
+                      <a:schemeClr val="dk1">
+                        <a:alpha val="40000"/>
+                      </a:schemeClr>
+                    </a:outerShdw>
+                  </a:effectLst>
+                </a:rPr>
+                <a:t>f(X)</a:t>
+              </a:r>
+              <a:endParaRPr lang="en-IN" b="1" dirty="0">
                 <a:solidFill>
                   <a:schemeClr val="bg1"/>
                 </a:solidFill>
-                <a:effectLst>
-                  <a:outerShdw blurRad="38100" dist="19050" dir="2700000" algn="tl" rotWithShape="0">
-                    <a:schemeClr val="dk1">
-                      <a:alpha val="40000"/>
-                    </a:schemeClr>
-                  </a:outerShdw>
-                </a:effectLst>
-              </a:rPr>
-              <a:t>Output </a:t>
-            </a:r>
-            <a:r>
-              <a:rPr lang="en-IN" sz="3200" b="1" dirty="0" smtClean="0">
-                <a:ln w="0"/>
+              </a:endParaRPr>
+            </a:p>
+          </p:txBody>
+        </p:sp>
+        <p:sp>
+          <p:nvSpPr>
+            <p:cNvPr id="21" name="Right Arrow 20"/>
+            <p:cNvSpPr/>
+            <p:nvPr/>
+          </p:nvSpPr>
+          <p:spPr>
+            <a:xfrm>
+              <a:off x="2103120" y="3050380"/>
+              <a:ext cx="2407585" cy="1294857"/>
+            </a:xfrm>
+            <a:prstGeom prst="rightArrow">
+              <a:avLst/>
+            </a:prstGeom>
+            <a:solidFill>
+              <a:schemeClr val="dk1">
+                <a:alpha val="50000"/>
+              </a:schemeClr>
+            </a:solidFill>
+            <a:ln>
+              <a:noFill/>
+            </a:ln>
+          </p:spPr>
+          <p:style>
+            <a:lnRef idx="0">
+              <a:scrgbClr r="0" g="0" b="0"/>
+            </a:lnRef>
+            <a:fillRef idx="0">
+              <a:scrgbClr r="0" g="0" b="0"/>
+            </a:fillRef>
+            <a:effectRef idx="0">
+              <a:scrgbClr r="0" g="0" b="0"/>
+            </a:effectRef>
+            <a:fontRef idx="minor">
+              <a:schemeClr val="lt1"/>
+            </a:fontRef>
+          </p:style>
+          <p:txBody>
+            <a:bodyPr rtlCol="0" anchor="ctr"/>
+            <a:lstStyle/>
+            <a:p>
+              <a:pPr algn="ctr"/>
+              <a:r>
+                <a:rPr lang="en-IN" sz="3200" dirty="0" smtClean="0">
+                  <a:ln w="0"/>
+                  <a:solidFill>
+                    <a:schemeClr val="bg1"/>
+                  </a:solidFill>
+                  <a:effectLst>
+                    <a:outerShdw blurRad="38100" dist="19050" dir="2700000" algn="tl" rotWithShape="0">
+                      <a:schemeClr val="dk1">
+                        <a:alpha val="40000"/>
+                      </a:schemeClr>
+                    </a:outerShdw>
+                  </a:effectLst>
+                </a:rPr>
+                <a:t>Input </a:t>
+              </a:r>
+              <a:r>
+                <a:rPr lang="en-IN" sz="3200" b="1" dirty="0" smtClean="0">
+                  <a:ln w="0"/>
+                  <a:solidFill>
+                    <a:schemeClr val="bg1"/>
+                  </a:solidFill>
+                  <a:effectLst>
+                    <a:outerShdw blurRad="38100" dist="19050" dir="2700000" algn="tl" rotWithShape="0">
+                      <a:schemeClr val="dk1">
+                        <a:alpha val="40000"/>
+                      </a:schemeClr>
+                    </a:outerShdw>
+                  </a:effectLst>
+                </a:rPr>
+                <a:t>X</a:t>
+              </a:r>
+              <a:endParaRPr lang="en-IN" b="1" dirty="0">
                 <a:solidFill>
                   <a:schemeClr val="bg1"/>
                 </a:solidFill>
-                <a:effectLst>
-                  <a:outerShdw blurRad="38100" dist="19050" dir="2700000" algn="tl" rotWithShape="0">
-                    <a:schemeClr val="dk1">
-                      <a:alpha val="40000"/>
-                    </a:schemeClr>
-                  </a:outerShdw>
-                </a:effectLst>
-              </a:rPr>
-              <a:t>f(X)</a:t>
-            </a:r>
-            <a:endParaRPr lang="en-IN" b="1" dirty="0">
-              <a:solidFill>
-                <a:schemeClr val="bg1"/>
-              </a:solidFill>
-            </a:endParaRPr>
-          </a:p>
-        </p:txBody>
-      </p:sp>
-      <p:sp>
-        <p:nvSpPr>
-          <p:cNvPr id="21" name="Right Arrow 20"/>
-          <p:cNvSpPr/>
-          <p:nvPr/>
-        </p:nvSpPr>
-        <p:spPr>
-          <a:xfrm>
-            <a:off x="2855742" y="2118942"/>
-            <a:ext cx="1772529" cy="1797149"/>
-          </a:xfrm>
-          <a:prstGeom prst="rightArrow">
-            <a:avLst/>
-          </a:prstGeom>
-        </p:spPr>
-        <p:style>
-          <a:lnRef idx="2">
-            <a:schemeClr val="accent1">
-              <a:shade val="50000"/>
-            </a:schemeClr>
-          </a:lnRef>
-          <a:fillRef idx="1">
-            <a:schemeClr val="accent1"/>
-          </a:fillRef>
-          <a:effectRef idx="0">
-            <a:schemeClr val="accent1"/>
-          </a:effectRef>
-          <a:fontRef idx="minor">
-            <a:schemeClr val="lt1"/>
-          </a:fontRef>
-        </p:style>
-        <p:txBody>
-          <a:bodyPr rtlCol="0" anchor="ctr"/>
-          <a:lstStyle/>
-          <a:p>
-            <a:pPr algn="ctr"/>
-            <a:r>
-              <a:rPr lang="en-IN" sz="3200" dirty="0" smtClean="0">
-                <a:ln w="0"/>
-                <a:solidFill>
-                  <a:schemeClr val="bg1"/>
-                </a:solidFill>
-                <a:effectLst>
-                  <a:outerShdw blurRad="38100" dist="19050" dir="2700000" algn="tl" rotWithShape="0">
-                    <a:schemeClr val="dk1">
-                      <a:alpha val="40000"/>
-                    </a:schemeClr>
-                  </a:outerShdw>
-                </a:effectLst>
-              </a:rPr>
-              <a:t>Input</a:t>
-            </a:r>
-          </a:p>
-          <a:p>
-            <a:pPr algn="ctr"/>
-            <a:r>
-              <a:rPr lang="en-IN" sz="3200" b="1" dirty="0" smtClean="0">
-                <a:ln w="0"/>
-                <a:solidFill>
-                  <a:schemeClr val="bg1"/>
-                </a:solidFill>
-                <a:effectLst>
-                  <a:outerShdw blurRad="38100" dist="19050" dir="2700000" algn="tl" rotWithShape="0">
-                    <a:schemeClr val="dk1">
-                      <a:alpha val="40000"/>
-                    </a:schemeClr>
-                  </a:outerShdw>
-                </a:effectLst>
-              </a:rPr>
-              <a:t>X</a:t>
-            </a:r>
-            <a:endParaRPr lang="en-IN" b="1" dirty="0">
-              <a:solidFill>
-                <a:schemeClr val="bg1"/>
-              </a:solidFill>
-            </a:endParaRPr>
-          </a:p>
-        </p:txBody>
-      </p:sp>
+              </a:endParaRPr>
+            </a:p>
+          </p:txBody>
+        </p:sp>
+      </p:grpSp>
     </p:spTree>
     <p:extLst>
       <p:ext uri="{BB962C8B-B14F-4D97-AF65-F5344CB8AC3E}">

</xml_diff>